<commit_message>
Added some things to the slides and the readme
</commit_message>
<xml_diff>
--- a/PowerPoint/Model to Determine a subreddit.pptx
+++ b/PowerPoint/Model to Determine a subreddit.pptx
@@ -339,7 +339,7 @@
           <a:p>
             <a:fld id="{8C7B84D5-0EFB-4320-94F6-EF3A76F74F21}" type="datetimeFigureOut">
               <a:rPr lang="en-US" smtClean="0"/>
-              <a:t>11/25/2024</a:t>
+              <a:t>11/26/2024</a:t>
             </a:fld>
             <a:endParaRPr lang="en-US"/>
           </a:p>
@@ -946,6 +946,104 @@
 </file>
 
 <file path=ppt/notesSlides/notesSlide3.xml><?xml version="1.0" encoding="utf-8"?>
+<p:notes xmlns:a="http://schemas.openxmlformats.org/drawingml/2006/main" xmlns:r="http://schemas.openxmlformats.org/officeDocument/2006/relationships" xmlns:p="http://schemas.openxmlformats.org/presentationml/2006/main">
+  <p:cSld>
+    <p:spTree>
+      <p:nvGrpSpPr>
+        <p:cNvPr id="1" name=""/>
+        <p:cNvGrpSpPr/>
+        <p:nvPr/>
+      </p:nvGrpSpPr>
+      <p:grpSpPr>
+        <a:xfrm>
+          <a:off x="0" y="0"/>
+          <a:ext cx="0" cy="0"/>
+          <a:chOff x="0" y="0"/>
+          <a:chExt cx="0" cy="0"/>
+        </a:xfrm>
+      </p:grpSpPr>
+      <p:sp>
+        <p:nvSpPr>
+          <p:cNvPr id="2" name="Slide Image Placeholder 1"/>
+          <p:cNvSpPr>
+            <a:spLocks noGrp="1" noRot="1" noChangeAspect="1"/>
+          </p:cNvSpPr>
+          <p:nvPr>
+            <p:ph type="sldImg"/>
+          </p:nvPr>
+        </p:nvSpPr>
+        <p:spPr/>
+      </p:sp>
+      <p:sp>
+        <p:nvSpPr>
+          <p:cNvPr id="3" name="Notes Placeholder 2"/>
+          <p:cNvSpPr>
+            <a:spLocks noGrp="1"/>
+          </p:cNvSpPr>
+          <p:nvPr>
+            <p:ph type="body" idx="1"/>
+          </p:nvPr>
+        </p:nvSpPr>
+        <p:spPr/>
+        <p:txBody>
+          <a:bodyPr/>
+          <a:lstStyle/>
+          <a:p>
+            <a:r>
+              <a:rPr lang="en-US" dirty="0"/>
+              <a:t>Image contributes to 3.5% of the total importance </a:t>
+            </a:r>
+          </a:p>
+          <a:p>
+            <a:r>
+              <a:rPr lang="en-US" dirty="0"/>
+              <a:t>Feature importance calc by how much it reduces </a:t>
+            </a:r>
+            <a:r>
+              <a:rPr lang="en-US" dirty="0" err="1"/>
+              <a:t>gini</a:t>
+            </a:r>
+            <a:endParaRPr lang="en-US" dirty="0"/>
+          </a:p>
+        </p:txBody>
+      </p:sp>
+      <p:sp>
+        <p:nvSpPr>
+          <p:cNvPr id="4" name="Slide Number Placeholder 3"/>
+          <p:cNvSpPr>
+            <a:spLocks noGrp="1"/>
+          </p:cNvSpPr>
+          <p:nvPr>
+            <p:ph type="sldNum" sz="quarter" idx="5"/>
+          </p:nvPr>
+        </p:nvSpPr>
+        <p:spPr/>
+        <p:txBody>
+          <a:bodyPr/>
+          <a:lstStyle/>
+          <a:p>
+            <a:fld id="{A9BA851B-641E-48E5-9FA7-CE50AE31CA21}" type="slidenum">
+              <a:rPr lang="en-US" smtClean="0"/>
+              <a:t>5</a:t>
+            </a:fld>
+            <a:endParaRPr lang="en-US"/>
+          </a:p>
+        </p:txBody>
+      </p:sp>
+    </p:spTree>
+    <p:extLst>
+      <p:ext uri="{BB962C8B-B14F-4D97-AF65-F5344CB8AC3E}">
+        <p14:creationId xmlns:p14="http://schemas.microsoft.com/office/powerpoint/2010/main" val="4014307720"/>
+      </p:ext>
+    </p:extLst>
+  </p:cSld>
+  <p:clrMapOvr>
+    <a:masterClrMapping/>
+  </p:clrMapOvr>
+</p:notes>
+</file>
+
+<file path=ppt/notesSlides/notesSlide4.xml><?xml version="1.0" encoding="utf-8"?>
 <p:notes xmlns:a="http://schemas.openxmlformats.org/drawingml/2006/main" xmlns:r="http://schemas.openxmlformats.org/officeDocument/2006/relationships" xmlns:p="http://schemas.openxmlformats.org/presentationml/2006/main" showMasterSp="0" showMasterPhAnim="0">
   <p:cSld>
     <p:spTree>
@@ -1049,7 +1147,7 @@
 </p:notes>
 </file>
 
-<file path=ppt/notesSlides/notesSlide4.xml><?xml version="1.0" encoding="utf-8"?>
+<file path=ppt/notesSlides/notesSlide5.xml><?xml version="1.0" encoding="utf-8"?>
 <p:notes xmlns:a="http://schemas.openxmlformats.org/drawingml/2006/main" xmlns:r="http://schemas.openxmlformats.org/officeDocument/2006/relationships" xmlns:p="http://schemas.openxmlformats.org/presentationml/2006/main" showMasterSp="0" showMasterPhAnim="0">
   <p:cSld>
     <p:spTree>
@@ -40611,42 +40709,6 @@
           </a:p>
         </p:txBody>
       </p:sp>
-      <p:pic>
-        <p:nvPicPr>
-          <p:cNvPr id="7" name="Picture 6">
-            <a:extLst>
-              <a:ext uri="{FF2B5EF4-FFF2-40B4-BE49-F238E27FC236}">
-                <a16:creationId xmlns:a16="http://schemas.microsoft.com/office/drawing/2014/main" id="{D996C920-048F-5086-4E57-98F4CAEAB758}"/>
-              </a:ext>
-            </a:extLst>
-          </p:cNvPr>
-          <p:cNvPicPr>
-            <a:picLocks noChangeAspect="1"/>
-          </p:cNvPicPr>
-          <p:nvPr/>
-        </p:nvPicPr>
-        <p:blipFill>
-          <a:blip r:embed="rId3">
-            <a:extLst>
-              <a:ext uri="{28A0092B-C50C-407E-A947-70E740481C1C}">
-                <a14:useLocalDpi xmlns:a14="http://schemas.microsoft.com/office/drawing/2010/main" val="0"/>
-              </a:ext>
-            </a:extLst>
-          </a:blip>
-          <a:stretch>
-            <a:fillRect/>
-          </a:stretch>
-        </p:blipFill>
-        <p:spPr>
-          <a:xfrm>
-            <a:off x="153880" y="1356967"/>
-            <a:ext cx="7054788" cy="5291092"/>
-          </a:xfrm>
-          <a:prstGeom prst="rect">
-            <a:avLst/>
-          </a:prstGeom>
-        </p:spPr>
-      </p:pic>
       <p:sp>
         <p:nvSpPr>
           <p:cNvPr id="13" name="TextBox 12">
@@ -40701,7 +40763,7 @@
           <p:nvPr/>
         </p:nvPicPr>
         <p:blipFill>
-          <a:blip r:embed="rId4"/>
+          <a:blip r:embed="rId3"/>
           <a:stretch>
             <a:fillRect/>
           </a:stretch>
@@ -40710,6 +40772,42 @@
           <a:xfrm>
             <a:off x="7538122" y="3898198"/>
             <a:ext cx="3938684" cy="898828"/>
+          </a:xfrm>
+          <a:prstGeom prst="rect">
+            <a:avLst/>
+          </a:prstGeom>
+        </p:spPr>
+      </p:pic>
+      <p:pic>
+        <p:nvPicPr>
+          <p:cNvPr id="5" name="Picture 4">
+            <a:extLst>
+              <a:ext uri="{FF2B5EF4-FFF2-40B4-BE49-F238E27FC236}">
+                <a16:creationId xmlns:a16="http://schemas.microsoft.com/office/drawing/2014/main" id="{912F77A2-889A-C37A-6390-129EA3D109AB}"/>
+              </a:ext>
+            </a:extLst>
+          </p:cNvPr>
+          <p:cNvPicPr>
+            <a:picLocks noChangeAspect="1"/>
+          </p:cNvPicPr>
+          <p:nvPr/>
+        </p:nvPicPr>
+        <p:blipFill>
+          <a:blip r:embed="rId4">
+            <a:extLst>
+              <a:ext uri="{28A0092B-C50C-407E-A947-70E740481C1C}">
+                <a14:useLocalDpi xmlns:a14="http://schemas.microsoft.com/office/drawing/2010/main" val="0"/>
+              </a:ext>
+            </a:extLst>
+          </a:blip>
+          <a:stretch>
+            <a:fillRect/>
+          </a:stretch>
+        </p:blipFill>
+        <p:spPr>
+          <a:xfrm>
+            <a:off x="157019" y="1267765"/>
+            <a:ext cx="7204364" cy="5403272"/>
           </a:xfrm>
           <a:prstGeom prst="rect">
             <a:avLst/>
@@ -40819,7 +40917,7 @@
           <p:nvPr/>
         </p:nvPicPr>
         <p:blipFill>
-          <a:blip r:embed="rId2">
+          <a:blip r:embed="rId3">
             <a:extLst>
               <a:ext uri="{28A0092B-C50C-407E-A947-70E740481C1C}">
                 <a14:useLocalDpi xmlns:a14="http://schemas.microsoft.com/office/drawing/2010/main" val="0"/>

</xml_diff>